<commit_message>
Manual do App pronto
</commit_message>
<xml_diff>
--- a/Manual/Manual.pptx
+++ b/Manual/Manual.pptx
@@ -110,6 +110,11 @@
       </a:defRPr>
     </a:lvl9pPr>
   </p:defaultTextStyle>
+  <p:extLst>
+    <p:ext uri="{EFAFB233-063F-42B5-8137-9DF3F51BA10A}">
+      <p15:sldGuideLst xmlns:p15="http://schemas.microsoft.com/office/powerpoint/2012/main"/>
+    </p:ext>
+  </p:extLst>
 </p:presentation>
 </file>
 
@@ -1755,14 +1760,35 @@
         </dgm:presLayoutVars>
       </dgm:prSet>
       <dgm:spPr/>
+      <dgm:t>
+        <a:bodyPr/>
+        <a:lstStyle/>
+        <a:p>
+          <a:endParaRPr lang="pt-BR"/>
+        </a:p>
+      </dgm:t>
     </dgm:pt>
     <dgm:pt modelId="{0D00F716-ECDE-48CF-8187-EBA8CB42DF83}" type="pres">
       <dgm:prSet presAssocID="{BFDD01EF-9601-4F78-A9D0-03B9C7C41807}" presName="gear1srcNode" presStyleLbl="node1" presStyleIdx="0" presStyleCnt="3"/>
       <dgm:spPr/>
+      <dgm:t>
+        <a:bodyPr/>
+        <a:lstStyle/>
+        <a:p>
+          <a:endParaRPr lang="pt-BR"/>
+        </a:p>
+      </dgm:t>
     </dgm:pt>
     <dgm:pt modelId="{DB9C7A43-A252-4994-9DE1-8A07C33EF245}" type="pres">
       <dgm:prSet presAssocID="{BFDD01EF-9601-4F78-A9D0-03B9C7C41807}" presName="gear1dstNode" presStyleLbl="node1" presStyleIdx="0" presStyleCnt="3"/>
       <dgm:spPr/>
+      <dgm:t>
+        <a:bodyPr/>
+        <a:lstStyle/>
+        <a:p>
+          <a:endParaRPr lang="pt-BR"/>
+        </a:p>
+      </dgm:t>
     </dgm:pt>
     <dgm:pt modelId="{3A9F7220-67D4-4834-99ED-BF0B57CA05E3}" type="pres">
       <dgm:prSet presAssocID="{A8CBF0B5-E548-461C-BF82-495E6B6B80A4}" presName="gear2" presStyleLbl="node1" presStyleIdx="1" presStyleCnt="3">
@@ -1783,14 +1809,35 @@
     <dgm:pt modelId="{01DB1232-6A0D-4466-8432-AD7478100C53}" type="pres">
       <dgm:prSet presAssocID="{A8CBF0B5-E548-461C-BF82-495E6B6B80A4}" presName="gear2srcNode" presStyleLbl="node1" presStyleIdx="1" presStyleCnt="3"/>
       <dgm:spPr/>
+      <dgm:t>
+        <a:bodyPr/>
+        <a:lstStyle/>
+        <a:p>
+          <a:endParaRPr lang="pt-BR"/>
+        </a:p>
+      </dgm:t>
     </dgm:pt>
     <dgm:pt modelId="{402BF0E5-650D-4F3B-B69A-CD4C05983483}" type="pres">
       <dgm:prSet presAssocID="{A8CBF0B5-E548-461C-BF82-495E6B6B80A4}" presName="gear2dstNode" presStyleLbl="node1" presStyleIdx="1" presStyleCnt="3"/>
       <dgm:spPr/>
+      <dgm:t>
+        <a:bodyPr/>
+        <a:lstStyle/>
+        <a:p>
+          <a:endParaRPr lang="pt-BR"/>
+        </a:p>
+      </dgm:t>
     </dgm:pt>
     <dgm:pt modelId="{9DA6D337-AB41-4856-B2A9-DECFF90B3D4D}" type="pres">
       <dgm:prSet presAssocID="{5863BF0F-0445-4DFA-B914-8C24DA1C3F73}" presName="gear3" presStyleLbl="node1" presStyleIdx="2" presStyleCnt="3"/>
       <dgm:spPr/>
+      <dgm:t>
+        <a:bodyPr/>
+        <a:lstStyle/>
+        <a:p>
+          <a:endParaRPr lang="pt-BR"/>
+        </a:p>
+      </dgm:t>
     </dgm:pt>
     <dgm:pt modelId="{4C0C9B66-1E1B-42AB-A261-9F56F692BFAA}" type="pres">
       <dgm:prSet presAssocID="{5863BF0F-0445-4DFA-B914-8C24DA1C3F73}" presName="gear3tx" presStyleLbl="node1" presStyleIdx="2" presStyleCnt="3">
@@ -1800,26 +1847,68 @@
         </dgm:presLayoutVars>
       </dgm:prSet>
       <dgm:spPr/>
+      <dgm:t>
+        <a:bodyPr/>
+        <a:lstStyle/>
+        <a:p>
+          <a:endParaRPr lang="pt-BR"/>
+        </a:p>
+      </dgm:t>
     </dgm:pt>
     <dgm:pt modelId="{F381812F-42AC-4CAB-922C-614437EA8023}" type="pres">
       <dgm:prSet presAssocID="{5863BF0F-0445-4DFA-B914-8C24DA1C3F73}" presName="gear3srcNode" presStyleLbl="node1" presStyleIdx="2" presStyleCnt="3"/>
       <dgm:spPr/>
+      <dgm:t>
+        <a:bodyPr/>
+        <a:lstStyle/>
+        <a:p>
+          <a:endParaRPr lang="pt-BR"/>
+        </a:p>
+      </dgm:t>
     </dgm:pt>
     <dgm:pt modelId="{AE0DC529-D204-4A0A-A217-B6B88AEA1BE5}" type="pres">
       <dgm:prSet presAssocID="{5863BF0F-0445-4DFA-B914-8C24DA1C3F73}" presName="gear3dstNode" presStyleLbl="node1" presStyleIdx="2" presStyleCnt="3"/>
       <dgm:spPr/>
+      <dgm:t>
+        <a:bodyPr/>
+        <a:lstStyle/>
+        <a:p>
+          <a:endParaRPr lang="pt-BR"/>
+        </a:p>
+      </dgm:t>
     </dgm:pt>
     <dgm:pt modelId="{96996AE9-90DF-4074-AAA4-252A5FE9D44C}" type="pres">
       <dgm:prSet presAssocID="{2CF05A76-7585-4931-B616-9DD04A45EB8F}" presName="connector1" presStyleLbl="sibTrans2D1" presStyleIdx="0" presStyleCnt="3"/>
       <dgm:spPr/>
+      <dgm:t>
+        <a:bodyPr/>
+        <a:lstStyle/>
+        <a:p>
+          <a:endParaRPr lang="pt-BR"/>
+        </a:p>
+      </dgm:t>
     </dgm:pt>
     <dgm:pt modelId="{71FAE588-07D1-4429-92D3-2DBD69512CF3}" type="pres">
       <dgm:prSet presAssocID="{D488A57E-E7C1-426E-8438-88133DC437A6}" presName="connector2" presStyleLbl="sibTrans2D1" presStyleIdx="1" presStyleCnt="3"/>
       <dgm:spPr/>
+      <dgm:t>
+        <a:bodyPr/>
+        <a:lstStyle/>
+        <a:p>
+          <a:endParaRPr lang="pt-BR"/>
+        </a:p>
+      </dgm:t>
     </dgm:pt>
     <dgm:pt modelId="{F67A9313-95FB-4650-BC77-042F2FD78661}" type="pres">
       <dgm:prSet presAssocID="{20BCC25E-F9A4-42BB-82F4-73CF9E90DF2F}" presName="connector3" presStyleLbl="sibTrans2D1" presStyleIdx="2" presStyleCnt="3"/>
       <dgm:spPr/>
+      <dgm:t>
+        <a:bodyPr/>
+        <a:lstStyle/>
+        <a:p>
+          <a:endParaRPr lang="pt-BR"/>
+        </a:p>
+      </dgm:t>
     </dgm:pt>
   </dgm:ptLst>
   <dgm:cxnLst>
@@ -1830,8 +1919,8 @@
     <dgm:cxn modelId="{818E32A1-3981-4C81-961F-2491CC45CE37}" type="presOf" srcId="{A8CBF0B5-E548-461C-BF82-495E6B6B80A4}" destId="{3A9F7220-67D4-4834-99ED-BF0B57CA05E3}" srcOrd="0" destOrd="0" presId="urn:microsoft.com/office/officeart/2005/8/layout/gear1"/>
     <dgm:cxn modelId="{20D7C438-2CB6-4947-9090-113E73283DBF}" type="presOf" srcId="{5863BF0F-0445-4DFA-B914-8C24DA1C3F73}" destId="{4C0C9B66-1E1B-42AB-A261-9F56F692BFAA}" srcOrd="1" destOrd="0" presId="urn:microsoft.com/office/officeart/2005/8/layout/gear1"/>
     <dgm:cxn modelId="{8E40E72E-70EE-47D9-B343-FEDD8EC47416}" srcId="{C1FCEC8A-A63C-48B8-8105-091DE35A94EC}" destId="{A8CBF0B5-E548-461C-BF82-495E6B6B80A4}" srcOrd="1" destOrd="0" parTransId="{E1BF3776-C765-4A36-BB7D-6231B0F3390D}" sibTransId="{D488A57E-E7C1-426E-8438-88133DC437A6}"/>
+    <dgm:cxn modelId="{7CF7F2BF-FD5C-43AA-A0F1-A68435D4CF8B}" type="presOf" srcId="{2CF05A76-7585-4931-B616-9DD04A45EB8F}" destId="{96996AE9-90DF-4074-AAA4-252A5FE9D44C}" srcOrd="0" destOrd="0" presId="urn:microsoft.com/office/officeart/2005/8/layout/gear1"/>
     <dgm:cxn modelId="{83E6B974-3165-4E09-BE41-E79943B541D7}" type="presOf" srcId="{5863BF0F-0445-4DFA-B914-8C24DA1C3F73}" destId="{9DA6D337-AB41-4856-B2A9-DECFF90B3D4D}" srcOrd="0" destOrd="0" presId="urn:microsoft.com/office/officeart/2005/8/layout/gear1"/>
-    <dgm:cxn modelId="{7CF7F2BF-FD5C-43AA-A0F1-A68435D4CF8B}" type="presOf" srcId="{2CF05A76-7585-4931-B616-9DD04A45EB8F}" destId="{96996AE9-90DF-4074-AAA4-252A5FE9D44C}" srcOrd="0" destOrd="0" presId="urn:microsoft.com/office/officeart/2005/8/layout/gear1"/>
     <dgm:cxn modelId="{E619F5EE-4B0B-4718-84D5-411376653D41}" type="presOf" srcId="{5863BF0F-0445-4DFA-B914-8C24DA1C3F73}" destId="{AE0DC529-D204-4A0A-A217-B6B88AEA1BE5}" srcOrd="3" destOrd="0" presId="urn:microsoft.com/office/officeart/2005/8/layout/gear1"/>
     <dgm:cxn modelId="{A350C55D-6145-4AB9-8D04-DC1155F1CA4D}" type="presOf" srcId="{D488A57E-E7C1-426E-8438-88133DC437A6}" destId="{71FAE588-07D1-4429-92D3-2DBD69512CF3}" srcOrd="0" destOrd="0" presId="urn:microsoft.com/office/officeart/2005/8/layout/gear1"/>
     <dgm:cxn modelId="{CA8DC21A-9778-4DC3-A7BB-899E24466FB9}" type="presOf" srcId="{BFDD01EF-9601-4F78-A9D0-03B9C7C41807}" destId="{0D00F716-ECDE-48CF-8187-EBA8CB42DF83}" srcOrd="1" destOrd="0" presId="urn:microsoft.com/office/officeart/2005/8/layout/gear1"/>
@@ -2036,14 +2125,35 @@
         </dgm:presLayoutVars>
       </dgm:prSet>
       <dgm:spPr/>
+      <dgm:t>
+        <a:bodyPr/>
+        <a:lstStyle/>
+        <a:p>
+          <a:endParaRPr lang="pt-BR"/>
+        </a:p>
+      </dgm:t>
     </dgm:pt>
     <dgm:pt modelId="{16AAA553-96BC-4A9C-A0EE-847C0ED0B262}" type="pres">
       <dgm:prSet presAssocID="{70895831-45CF-43C7-BC93-919F69B7A0F8}" presName="centerShape" presStyleLbl="node0" presStyleIdx="0" presStyleCnt="1"/>
       <dgm:spPr/>
+      <dgm:t>
+        <a:bodyPr/>
+        <a:lstStyle/>
+        <a:p>
+          <a:endParaRPr lang="pt-BR"/>
+        </a:p>
+      </dgm:t>
     </dgm:pt>
     <dgm:pt modelId="{91F0C183-45B5-4E56-B9D9-23E983C8D65B}" type="pres">
       <dgm:prSet presAssocID="{82D0D287-7267-46B1-8C75-9D4B437D201B}" presName="parTrans" presStyleLbl="bgSibTrans2D1" presStyleIdx="0" presStyleCnt="3"/>
       <dgm:spPr/>
+      <dgm:t>
+        <a:bodyPr/>
+        <a:lstStyle/>
+        <a:p>
+          <a:endParaRPr lang="pt-BR"/>
+        </a:p>
+      </dgm:t>
     </dgm:pt>
     <dgm:pt modelId="{F6184AC1-F27F-4637-BF9A-C4849FE47D83}" type="pres">
       <dgm:prSet presAssocID="{7E8F4055-DDD5-4664-8DAE-F65BE5A41C58}" presName="node" presStyleLbl="node1" presStyleIdx="0" presStyleCnt="3">
@@ -2052,10 +2162,24 @@
         </dgm:presLayoutVars>
       </dgm:prSet>
       <dgm:spPr/>
+      <dgm:t>
+        <a:bodyPr/>
+        <a:lstStyle/>
+        <a:p>
+          <a:endParaRPr lang="pt-BR"/>
+        </a:p>
+      </dgm:t>
     </dgm:pt>
     <dgm:pt modelId="{7AE063A2-B848-48DF-8587-CD98D8F2C9E0}" type="pres">
       <dgm:prSet presAssocID="{81D7E891-4D35-47A9-8AB9-68569490BA31}" presName="parTrans" presStyleLbl="bgSibTrans2D1" presStyleIdx="1" presStyleCnt="3"/>
       <dgm:spPr/>
+      <dgm:t>
+        <a:bodyPr/>
+        <a:lstStyle/>
+        <a:p>
+          <a:endParaRPr lang="pt-BR"/>
+        </a:p>
+      </dgm:t>
     </dgm:pt>
     <dgm:pt modelId="{05614524-10BE-4777-87BB-7649BA0C3AF4}" type="pres">
       <dgm:prSet presAssocID="{E2850906-FB9B-4647-A4B3-A26C067DC36D}" presName="node" presStyleLbl="node1" presStyleIdx="1" presStyleCnt="3">
@@ -2075,6 +2199,13 @@
     <dgm:pt modelId="{036B5F1C-8DF1-47A9-A032-E6B253A12A6E}" type="pres">
       <dgm:prSet presAssocID="{BA2C16B9-A71F-4346-9A5D-391B97840EDE}" presName="parTrans" presStyleLbl="bgSibTrans2D1" presStyleIdx="2" presStyleCnt="3"/>
       <dgm:spPr/>
+      <dgm:t>
+        <a:bodyPr/>
+        <a:lstStyle/>
+        <a:p>
+          <a:endParaRPr lang="pt-BR"/>
+        </a:p>
+      </dgm:t>
     </dgm:pt>
     <dgm:pt modelId="{6408CBF9-1405-4515-8D9D-A97C4BDDA962}" type="pres">
       <dgm:prSet presAssocID="{7C4A96B3-3FCA-45B1-B283-324E0130ADAA}" presName="node" presStyleLbl="node1" presStyleIdx="2" presStyleCnt="3">
@@ -2093,18 +2224,18 @@
     </dgm:pt>
   </dgm:ptLst>
   <dgm:cxnLst>
+    <dgm:cxn modelId="{CF160FC7-2300-4D96-A429-C1CA2AF430FB}" type="presOf" srcId="{E2850906-FB9B-4647-A4B3-A26C067DC36D}" destId="{05614524-10BE-4777-87BB-7649BA0C3AF4}" srcOrd="0" destOrd="0" presId="urn:microsoft.com/office/officeart/2005/8/layout/radial4"/>
+    <dgm:cxn modelId="{26FEF60B-5DF0-4BE0-9FC3-0CA13A95FF30}" type="presOf" srcId="{74DD3C82-D8F6-4E88-AD96-F9E39630CE83}" destId="{72313260-2508-4FCB-A9B2-E6E6112EA61F}" srcOrd="0" destOrd="0" presId="urn:microsoft.com/office/officeart/2005/8/layout/radial4"/>
+    <dgm:cxn modelId="{ADD63BA6-18AA-4EC6-A168-FC7E499EE163}" srcId="{70895831-45CF-43C7-BC93-919F69B7A0F8}" destId="{7C4A96B3-3FCA-45B1-B283-324E0130ADAA}" srcOrd="2" destOrd="0" parTransId="{BA2C16B9-A71F-4346-9A5D-391B97840EDE}" sibTransId="{F17FA7F5-A91C-4CFE-AB96-1E299E99F39C}"/>
+    <dgm:cxn modelId="{D5F6D148-E93B-4156-BFB9-2F3F65C4A0F4}" type="presOf" srcId="{70895831-45CF-43C7-BC93-919F69B7A0F8}" destId="{16AAA553-96BC-4A9C-A0EE-847C0ED0B262}" srcOrd="0" destOrd="0" presId="urn:microsoft.com/office/officeart/2005/8/layout/radial4"/>
+    <dgm:cxn modelId="{C73D761D-F5A6-4437-ADF1-1492E71B0CA7}" type="presOf" srcId="{81D7E891-4D35-47A9-8AB9-68569490BA31}" destId="{7AE063A2-B848-48DF-8587-CD98D8F2C9E0}" srcOrd="0" destOrd="0" presId="urn:microsoft.com/office/officeart/2005/8/layout/radial4"/>
+    <dgm:cxn modelId="{984835E0-F673-4E84-A982-28D1CCBD711F}" type="presOf" srcId="{7C4A96B3-3FCA-45B1-B283-324E0130ADAA}" destId="{6408CBF9-1405-4515-8D9D-A97C4BDDA962}" srcOrd="0" destOrd="0" presId="urn:microsoft.com/office/officeart/2005/8/layout/radial4"/>
+    <dgm:cxn modelId="{8D4D2647-1DBA-4DFD-A5A8-8070FBC4ABD0}" type="presOf" srcId="{82D0D287-7267-46B1-8C75-9D4B437D201B}" destId="{91F0C183-45B5-4E56-B9D9-23E983C8D65B}" srcOrd="0" destOrd="0" presId="urn:microsoft.com/office/officeart/2005/8/layout/radial4"/>
     <dgm:cxn modelId="{2D85A8FF-8B2E-4DA5-8A57-FA5D81AF6F6A}" srcId="{70895831-45CF-43C7-BC93-919F69B7A0F8}" destId="{E2850906-FB9B-4647-A4B3-A26C067DC36D}" srcOrd="1" destOrd="0" parTransId="{81D7E891-4D35-47A9-8AB9-68569490BA31}" sibTransId="{25F4FAE4-0362-4BEF-B499-285FC78CB432}"/>
-    <dgm:cxn modelId="{984835E0-F673-4E84-A982-28D1CCBD711F}" type="presOf" srcId="{7C4A96B3-3FCA-45B1-B283-324E0130ADAA}" destId="{6408CBF9-1405-4515-8D9D-A97C4BDDA962}" srcOrd="0" destOrd="0" presId="urn:microsoft.com/office/officeart/2005/8/layout/radial4"/>
-    <dgm:cxn modelId="{D5F6D148-E93B-4156-BFB9-2F3F65C4A0F4}" type="presOf" srcId="{70895831-45CF-43C7-BC93-919F69B7A0F8}" destId="{16AAA553-96BC-4A9C-A0EE-847C0ED0B262}" srcOrd="0" destOrd="0" presId="urn:microsoft.com/office/officeart/2005/8/layout/radial4"/>
-    <dgm:cxn modelId="{B1CCBCD7-5263-4B59-BABC-A357C51C3533}" srcId="{70895831-45CF-43C7-BC93-919F69B7A0F8}" destId="{7E8F4055-DDD5-4664-8DAE-F65BE5A41C58}" srcOrd="0" destOrd="0" parTransId="{82D0D287-7267-46B1-8C75-9D4B437D201B}" sibTransId="{876B7781-A093-4BDE-81D6-FD809F7E2F85}"/>
-    <dgm:cxn modelId="{26FEF60B-5DF0-4BE0-9FC3-0CA13A95FF30}" type="presOf" srcId="{74DD3C82-D8F6-4E88-AD96-F9E39630CE83}" destId="{72313260-2508-4FCB-A9B2-E6E6112EA61F}" srcOrd="0" destOrd="0" presId="urn:microsoft.com/office/officeart/2005/8/layout/radial4"/>
     <dgm:cxn modelId="{DDEE8E29-BF15-4827-8CD0-9B209DCAC6E2}" type="presOf" srcId="{BA2C16B9-A71F-4346-9A5D-391B97840EDE}" destId="{036B5F1C-8DF1-47A9-A032-E6B253A12A6E}" srcOrd="0" destOrd="0" presId="urn:microsoft.com/office/officeart/2005/8/layout/radial4"/>
-    <dgm:cxn modelId="{CF160FC7-2300-4D96-A429-C1CA2AF430FB}" type="presOf" srcId="{E2850906-FB9B-4647-A4B3-A26C067DC36D}" destId="{05614524-10BE-4777-87BB-7649BA0C3AF4}" srcOrd="0" destOrd="0" presId="urn:microsoft.com/office/officeart/2005/8/layout/radial4"/>
-    <dgm:cxn modelId="{8D4D2647-1DBA-4DFD-A5A8-8070FBC4ABD0}" type="presOf" srcId="{82D0D287-7267-46B1-8C75-9D4B437D201B}" destId="{91F0C183-45B5-4E56-B9D9-23E983C8D65B}" srcOrd="0" destOrd="0" presId="urn:microsoft.com/office/officeart/2005/8/layout/radial4"/>
-    <dgm:cxn modelId="{ADD63BA6-18AA-4EC6-A168-FC7E499EE163}" srcId="{70895831-45CF-43C7-BC93-919F69B7A0F8}" destId="{7C4A96B3-3FCA-45B1-B283-324E0130ADAA}" srcOrd="2" destOrd="0" parTransId="{BA2C16B9-A71F-4346-9A5D-391B97840EDE}" sibTransId="{F17FA7F5-A91C-4CFE-AB96-1E299E99F39C}"/>
-    <dgm:cxn modelId="{C73D761D-F5A6-4437-ADF1-1492E71B0CA7}" type="presOf" srcId="{81D7E891-4D35-47A9-8AB9-68569490BA31}" destId="{7AE063A2-B848-48DF-8587-CD98D8F2C9E0}" srcOrd="0" destOrd="0" presId="urn:microsoft.com/office/officeart/2005/8/layout/radial4"/>
     <dgm:cxn modelId="{574D8788-075D-4C3D-9D04-24DD75FD48E4}" type="presOf" srcId="{7E8F4055-DDD5-4664-8DAE-F65BE5A41C58}" destId="{F6184AC1-F27F-4637-BF9A-C4849FE47D83}" srcOrd="0" destOrd="0" presId="urn:microsoft.com/office/officeart/2005/8/layout/radial4"/>
     <dgm:cxn modelId="{476237C6-EBF9-4905-A182-5A6C92DD737D}" srcId="{74DD3C82-D8F6-4E88-AD96-F9E39630CE83}" destId="{70895831-45CF-43C7-BC93-919F69B7A0F8}" srcOrd="0" destOrd="0" parTransId="{27FD1226-244F-47BC-B6F5-FA21E089EB4E}" sibTransId="{1706062A-3E2D-4AB0-8B6F-B93203CFB361}"/>
+    <dgm:cxn modelId="{B1CCBCD7-5263-4B59-BABC-A357C51C3533}" srcId="{70895831-45CF-43C7-BC93-919F69B7A0F8}" destId="{7E8F4055-DDD5-4664-8DAE-F65BE5A41C58}" srcOrd="0" destOrd="0" parTransId="{82D0D287-7267-46B1-8C75-9D4B437D201B}" sibTransId="{876B7781-A093-4BDE-81D6-FD809F7E2F85}"/>
     <dgm:cxn modelId="{D351F568-E226-445F-835B-342E27A45743}" type="presParOf" srcId="{72313260-2508-4FCB-A9B2-E6E6112EA61F}" destId="{16AAA553-96BC-4A9C-A0EE-847C0ED0B262}" srcOrd="0" destOrd="0" presId="urn:microsoft.com/office/officeart/2005/8/layout/radial4"/>
     <dgm:cxn modelId="{B84F5D20-872C-410D-ADCC-DA646CD06CBB}" type="presParOf" srcId="{72313260-2508-4FCB-A9B2-E6E6112EA61F}" destId="{91F0C183-45B5-4E56-B9D9-23E983C8D65B}" srcOrd="1" destOrd="0" presId="urn:microsoft.com/office/officeart/2005/8/layout/radial4"/>
     <dgm:cxn modelId="{B948CA79-8F6B-4650-A82E-AF2605B8D3FF}" type="presParOf" srcId="{72313260-2508-4FCB-A9B2-E6E6112EA61F}" destId="{F6184AC1-F27F-4637-BF9A-C4849FE47D83}" srcOrd="2" destOrd="0" presId="urn:microsoft.com/office/officeart/2005/8/layout/radial4"/>
@@ -10522,25 +10653,35 @@
           </a:p>
         </p:txBody>
       </p:sp>
-      <p:sp>
-        <p:nvSpPr>
-          <p:cNvPr id="3" name="Espaço Reservado para Conteúdo 2"/>
-          <p:cNvSpPr>
-            <a:spLocks noGrp="1"/>
-          </p:cNvSpPr>
+      <p:pic>
+        <p:nvPicPr>
+          <p:cNvPr id="4" name="Espaço Reservado para Conteúdo 3"/>
+          <p:cNvPicPr>
+            <a:picLocks noGrp="1" noChangeAspect="1"/>
+          </p:cNvPicPr>
           <p:nvPr>
             <p:ph idx="1"/>
           </p:nvPr>
-        </p:nvSpPr>
-        <p:spPr/>
-        <p:txBody>
-          <a:bodyPr/>
-          <a:lstStyle/>
-          <a:p>
-            <a:endParaRPr lang="pt-BR" dirty="0"/>
-          </a:p>
-        </p:txBody>
-      </p:sp>
+        </p:nvPicPr>
+        <p:blipFill>
+          <a:blip r:embed="rId2">
+            <a:extLst>
+              <a:ext uri="{28A0092B-C50C-407E-A947-70E740481C1C}">
+                <a14:useLocalDpi xmlns:a14="http://schemas.microsoft.com/office/drawing/2010/main" val="0"/>
+              </a:ext>
+            </a:extLst>
+          </a:blip>
+          <a:stretch>
+            <a:fillRect/>
+          </a:stretch>
+        </p:blipFill>
+        <p:spPr>
+          <a:xfrm>
+            <a:off x="6705359" y="702156"/>
+            <a:ext cx="3666549" cy="5777319"/>
+          </a:xfrm>
+        </p:spPr>
+      </p:pic>
       <p:sp>
         <p:nvSpPr>
           <p:cNvPr id="5" name="Texto Explicativo Retangular 4"/>
@@ -10666,6 +10807,7 @@
           <a:bodyPr/>
           <a:lstStyle/>
           <a:p>
+            <a:pPr algn="r"/>
             <a:r>
               <a:rPr lang="pt-BR" dirty="0" smtClean="0"/>
               <a:t>publicações</a:t>
@@ -10674,25 +10816,35 @@
           </a:p>
         </p:txBody>
       </p:sp>
-      <p:sp>
-        <p:nvSpPr>
-          <p:cNvPr id="3" name="Espaço Reservado para Conteúdo 2"/>
-          <p:cNvSpPr>
-            <a:spLocks noGrp="1"/>
-          </p:cNvSpPr>
+      <p:pic>
+        <p:nvPicPr>
+          <p:cNvPr id="5" name="Espaço Reservado para Conteúdo 4"/>
+          <p:cNvPicPr>
+            <a:picLocks noGrp="1" noChangeAspect="1"/>
+          </p:cNvPicPr>
           <p:nvPr>
             <p:ph idx="1"/>
           </p:nvPr>
-        </p:nvSpPr>
-        <p:spPr/>
-        <p:txBody>
-          <a:bodyPr/>
-          <a:lstStyle/>
-          <a:p>
-            <a:endParaRPr lang="pt-BR"/>
-          </a:p>
-        </p:txBody>
-      </p:sp>
+        </p:nvPicPr>
+        <p:blipFill>
+          <a:blip r:embed="rId2">
+            <a:extLst>
+              <a:ext uri="{28A0092B-C50C-407E-A947-70E740481C1C}">
+                <a14:useLocalDpi xmlns:a14="http://schemas.microsoft.com/office/drawing/2010/main" val="0"/>
+              </a:ext>
+            </a:extLst>
+          </a:blip>
+          <a:stretch>
+            <a:fillRect/>
+          </a:stretch>
+        </p:blipFill>
+        <p:spPr>
+          <a:xfrm>
+            <a:off x="1414902" y="702156"/>
+            <a:ext cx="3836366" cy="6044896"/>
+          </a:xfrm>
+        </p:spPr>
+      </p:pic>
       <p:sp>
         <p:nvSpPr>
           <p:cNvPr id="4" name="Texto Explicativo Retangular 3"/>
@@ -10830,25 +10982,35 @@
           </a:p>
         </p:txBody>
       </p:sp>
-      <p:sp>
-        <p:nvSpPr>
-          <p:cNvPr id="5" name="Espaço Reservado para Conteúdo 4"/>
-          <p:cNvSpPr>
-            <a:spLocks noGrp="1"/>
-          </p:cNvSpPr>
+      <p:pic>
+        <p:nvPicPr>
+          <p:cNvPr id="3" name="Espaço Reservado para Conteúdo 2"/>
+          <p:cNvPicPr>
+            <a:picLocks noGrp="1" noChangeAspect="1"/>
+          </p:cNvPicPr>
           <p:nvPr>
             <p:ph idx="1"/>
           </p:nvPr>
-        </p:nvSpPr>
-        <p:spPr/>
-        <p:txBody>
-          <a:bodyPr/>
-          <a:lstStyle/>
-          <a:p>
-            <a:endParaRPr lang="pt-BR" dirty="0"/>
-          </a:p>
-        </p:txBody>
-      </p:sp>
+        </p:nvPicPr>
+        <p:blipFill>
+          <a:blip r:embed="rId2">
+            <a:extLst>
+              <a:ext uri="{28A0092B-C50C-407E-A947-70E740481C1C}">
+                <a14:useLocalDpi xmlns:a14="http://schemas.microsoft.com/office/drawing/2010/main" val="0"/>
+              </a:ext>
+            </a:extLst>
+          </a:blip>
+          <a:stretch>
+            <a:fillRect/>
+          </a:stretch>
+        </p:blipFill>
+        <p:spPr>
+          <a:xfrm>
+            <a:off x="7389223" y="702156"/>
+            <a:ext cx="3766457" cy="5945556"/>
+          </a:xfrm>
+        </p:spPr>
+      </p:pic>
       <p:sp>
         <p:nvSpPr>
           <p:cNvPr id="7" name="Texto Explicativo Retangular 6"/>
@@ -10857,13 +11019,13 @@
         </p:nvSpPr>
         <p:spPr>
           <a:xfrm>
-            <a:off x="6531429" y="2445960"/>
+            <a:off x="744583" y="2546985"/>
             <a:ext cx="4728755" cy="3147374"/>
           </a:xfrm>
           <a:prstGeom prst="wedgeRectCallout">
             <a:avLst>
-              <a:gd name="adj1" fmla="val 5854"/>
-              <a:gd name="adj2" fmla="val 56882"/>
+              <a:gd name="adj1" fmla="val 34307"/>
+              <a:gd name="adj2" fmla="val 60617"/>
             </a:avLst>
           </a:prstGeom>
           <a:solidFill>
@@ -10917,6 +11079,14 @@
             <a:r>
               <a:rPr lang="pt-BR" sz="2300" dirty="0" smtClean="0"/>
               <a:t>Ao expandir uma publicação você pode responde-la e ajudar o autor da pergunta. Para isso basta você digitar no campo em branco e clicar em “Responder”. </a:t>
+            </a:r>
+            <a:endParaRPr lang="pt-BR" sz="2300" dirty="0" smtClean="0"/>
+          </a:p>
+          <a:p>
+            <a:pPr algn="ctr"/>
+            <a:r>
+              <a:rPr lang="pt-BR" sz="2300" dirty="0" smtClean="0"/>
+              <a:t>Aqui você também encontra a resposta de outros usuários.</a:t>
             </a:r>
             <a:endParaRPr lang="pt-BR" sz="2300" dirty="0"/>
           </a:p>

</xml_diff>